<commit_message>
More poster stuff and initial histogram file
</commit_message>
<xml_diff>
--- a/Poster/Poster.pptx
+++ b/Poster/Poster.pptx
@@ -16919,7 +16919,6 @@
               <a:rPr lang="en-US" dirty="0" smtClean="0"/>
               <a:t>Previous work extended the ideal point model from political science.</a:t>
             </a:r>
-            <a:endParaRPr lang="en-US" dirty="0" smtClean="0"/>
           </a:p>
         </p:txBody>
       </p:sp>
@@ -17087,11 +17086,7 @@
             </a:pPr>
             <a:r>
               <a:rPr lang="en-US" dirty="0" smtClean="0"/>
-              <a:t>Each SVM</a:t>
-            </a:r>
-            <a:r>
-              <a:rPr lang="en-US" dirty="0" smtClean="0"/>
-              <a:t> trained and tested on it’s representative votes</a:t>
+              <a:t>Each SVM trained and tested on it’s representative votes</a:t>
             </a:r>
           </a:p>
           <a:p>
@@ -17194,7 +17189,6 @@
               <a:rPr lang="en-US" dirty="0" smtClean="0"/>
               <a:t>Whether sponsor has a nickname</a:t>
             </a:r>
-            <a:endParaRPr lang="en-US" dirty="0" smtClean="0"/>
           </a:p>
           <a:p>
             <a:pPr marL="1346926" lvl="1" indent="-285750">
@@ -17245,7 +17239,6 @@
               <a:rPr lang="en-US" dirty="0" smtClean="0"/>
               <a:t>Month the bill was voted on</a:t>
             </a:r>
-            <a:endParaRPr lang="en-US" dirty="0" smtClean="0"/>
           </a:p>
           <a:p>
             <a:pPr marL="1346926" lvl="1" indent="-285750">
@@ -17402,7 +17395,11 @@
           <a:p>
             <a:r>
               <a:rPr lang="en-US" dirty="0" smtClean="0"/>
-              <a:t>Results + Statistical Analysis + Graphs go in this column.</a:t>
+              <a:t>List of best SVMs. </a:t>
+            </a:r>
+            <a:r>
+              <a:rPr lang="en-US" dirty="0" smtClean="0"/>
+              <a:t>Graph of compared accuracies. Average accuracies</a:t>
             </a:r>
             <a:endParaRPr lang="en-US" dirty="0"/>
           </a:p>
@@ -17467,7 +17464,7 @@
         <p:spPr>
           <a:xfrm>
             <a:off x="24694957" y="3997645"/>
-            <a:ext cx="7535264" cy="1216101"/>
+            <a:ext cx="7535264" cy="1548500"/>
           </a:xfrm>
         </p:spPr>
         <p:txBody>
@@ -17488,11 +17485,11 @@
             </a:r>
             <a:r>
               <a:rPr lang="en-US" dirty="0" smtClean="0"/>
-              <a:t> test on each representative’s optimized SVM against the baseline for </a:t>
-            </a:r>
-            <a:r>
-              <a:rPr lang="en-US" smtClean="0"/>
-              <a:t>each representative</a:t>
+              <a:t> test on each representative’s optimized SVM against the baseline for each </a:t>
+            </a:r>
+            <a:r>
+              <a:rPr lang="en-US" dirty="0" smtClean="0"/>
+              <a:t>representative.</a:t>
             </a:r>
           </a:p>
           <a:p>
@@ -17500,7 +17497,18 @@
               <a:buFont typeface="Arial" pitchFamily="34" charset="0"/>
               <a:buChar char="•"/>
             </a:pPr>
-            <a:endParaRPr lang="en-US"/>
+            <a:r>
+              <a:rPr lang="en-US" dirty="0" smtClean="0"/>
+              <a:t>Consider bill summary and bill category as further features. </a:t>
+            </a:r>
+            <a:endParaRPr lang="en-US" dirty="0" smtClean="0"/>
+          </a:p>
+          <a:p>
+            <a:pPr marL="285750" indent="-285750">
+              <a:buFont typeface="Arial" pitchFamily="34" charset="0"/>
+              <a:buChar char="•"/>
+            </a:pPr>
+            <a:endParaRPr lang="en-US" dirty="0"/>
           </a:p>
         </p:txBody>
       </p:sp>
@@ -17674,11 +17682,7 @@
           <a:p>
             <a:r>
               <a:rPr lang="en-US" dirty="0" smtClean="0"/>
-              <a:t>Can </a:t>
-            </a:r>
-            <a:r>
-              <a:rPr lang="en-US" dirty="0" smtClean="0"/>
-              <a:t>we predict with high accuracy (above a baseline prediction) how a representative will vote on a given item in Congress?</a:t>
+              <a:t>Can we predict with high accuracy (above a baseline prediction) how a representative will vote on a given item in Congress?</a:t>
             </a:r>
           </a:p>
           <a:p>
@@ -17696,11 +17700,7 @@
           <a:p>
             <a:r>
               <a:rPr lang="en-US" dirty="0" smtClean="0"/>
-              <a:t>Can we predict </a:t>
-            </a:r>
-            <a:r>
-              <a:rPr lang="en-US" dirty="0" smtClean="0"/>
-              <a:t>whether a bill will pass using individual representatives’ predictions?</a:t>
+              <a:t>Can we predict whether a bill will pass using individual representatives’ predictions?</a:t>
             </a:r>
             <a:endParaRPr lang="en-US" dirty="0"/>
           </a:p>

</xml_diff>

<commit_message>
still trying to unlink images
</commit_message>
<xml_diff>
--- a/Poster/Poster.pptx
+++ b/Poster/Poster.pptx
@@ -16913,15 +16913,7 @@
                   <a:schemeClr val="tx1"/>
                 </a:solidFill>
               </a:rPr>
-              <a:t>Representative vote prediction could give insight into representatives’ actual beliefs and platforms</a:t>
-            </a:r>
-            <a:r>
-              <a:rPr lang="en-US" dirty="0" smtClean="0">
-                <a:solidFill>
-                  <a:schemeClr val="tx1"/>
-                </a:solidFill>
-              </a:rPr>
-              <a:t>.</a:t>
+              <a:t>Representative vote prediction could give insight into representatives’ actual beliefs and platforms.</a:t>
             </a:r>
           </a:p>
           <a:p>
@@ -16937,11 +16929,6 @@
               </a:rPr>
               <a:t>It’s cool to predict political actions.</a:t>
             </a:r>
-            <a:endParaRPr lang="en-US" dirty="0" smtClean="0">
-              <a:solidFill>
-                <a:schemeClr val="tx1"/>
-              </a:solidFill>
-            </a:endParaRPr>
           </a:p>
           <a:p>
             <a:pPr marL="285750" indent="-285750">
@@ -17000,15 +16987,7 @@
                   <a:schemeClr val="tx1"/>
                 </a:solidFill>
               </a:rPr>
-              <a:t>Previous work extended the ideal point model from political science</a:t>
-            </a:r>
-            <a:r>
-              <a:rPr lang="en-US" dirty="0" smtClean="0">
-                <a:solidFill>
-                  <a:schemeClr val="tx1"/>
-                </a:solidFill>
-              </a:rPr>
-              <a:t>.</a:t>
+              <a:t>Previous work extended the ideal point model from political science.</a:t>
             </a:r>
           </a:p>
         </p:txBody>
@@ -17159,15 +17138,7 @@
                   <a:schemeClr val="tx1"/>
                 </a:solidFill>
               </a:rPr>
-              <a:t>Pulled information for each </a:t>
-            </a:r>
-            <a:r>
-              <a:rPr lang="en-US" dirty="0" smtClean="0">
-                <a:solidFill>
-                  <a:schemeClr val="tx1"/>
-                </a:solidFill>
-              </a:rPr>
-              <a:t>bill</a:t>
+              <a:t>Pulled information for each bill</a:t>
             </a:r>
             <a:endParaRPr lang="en-US" dirty="0">
               <a:solidFill>
@@ -17393,11 +17364,7 @@
           <a:p>
             <a:r>
               <a:rPr lang="en-US" dirty="0" smtClean="0"/>
-              <a:t>Data </a:t>
-            </a:r>
-            <a:r>
-              <a:rPr lang="en-US" dirty="0" smtClean="0"/>
-              <a:t>Collection</a:t>
+              <a:t>Data Collection</a:t>
             </a:r>
             <a:endParaRPr lang="en-US" dirty="0"/>
           </a:p>
@@ -17449,15 +17416,7 @@
             </a:pPr>
             <a:r>
               <a:rPr lang="en-US" dirty="0" smtClean="0"/>
-              <a:t>Range of test accuracies for baseline: [54.22%,</a:t>
-            </a:r>
-            <a:r>
-              <a:rPr lang="en-US" dirty="0" smtClean="0"/>
-              <a:t>100%</a:t>
-            </a:r>
-            <a:r>
-              <a:rPr lang="en-US" dirty="0" smtClean="0"/>
-              <a:t>]</a:t>
+              <a:t>Range of test accuracies for baseline: [54.22%,100%]</a:t>
             </a:r>
           </a:p>
           <a:p>
@@ -17479,7 +17438,6 @@
               <a:rPr lang="en-US" dirty="0" smtClean="0"/>
               <a:t>Generally Optimized SVM performed better than baseline on a per representative basis.</a:t>
             </a:r>
-            <a:endParaRPr lang="en-US" dirty="0" smtClean="0"/>
           </a:p>
         </p:txBody>
       </p:sp>
@@ -17575,15 +17533,7 @@
                   <a:schemeClr val="tx1"/>
                 </a:solidFill>
               </a:rPr>
-              <a:t> test on each representative’s optimized SVM against the baseline for each representative</a:t>
-            </a:r>
-            <a:r>
-              <a:rPr lang="en-US" dirty="0" smtClean="0">
-                <a:solidFill>
-                  <a:schemeClr val="tx1"/>
-                </a:solidFill>
-              </a:rPr>
-              <a:t>.</a:t>
+              <a:t> test on each representative’s optimized SVM against the baseline for each representative.</a:t>
             </a:r>
           </a:p>
           <a:p>
@@ -17605,7 +17555,7 @@
                   <a:schemeClr val="tx1"/>
                 </a:solidFill>
               </a:rPr>
-              <a:t>Mcnemar’s</a:t>
+              <a:t>McNemar’s</a:t>
             </a:r>
             <a:r>
               <a:rPr lang="en-US" dirty="0" smtClean="0">
@@ -17613,7 +17563,15 @@
                   <a:schemeClr val="tx1"/>
                 </a:solidFill>
               </a:rPr>
-              <a:t> tests to determine if optimized SVMs are likely better than baseline hypothesis.</a:t>
+              <a:t> </a:t>
+            </a:r>
+            <a:r>
+              <a:rPr lang="en-US" dirty="0" smtClean="0">
+                <a:solidFill>
+                  <a:schemeClr val="tx1"/>
+                </a:solidFill>
+              </a:rPr>
+              <a:t>tests to determine if optimized SVMs are likely better than baseline hypothesis.</a:t>
             </a:r>
           </a:p>
           <a:p>
@@ -17629,11 +17587,6 @@
               </a:rPr>
               <a:t>Separate bills into categories using clustering on bill summaries.</a:t>
             </a:r>
-            <a:endParaRPr lang="en-US" dirty="0" smtClean="0">
-              <a:solidFill>
-                <a:schemeClr val="tx1"/>
-              </a:solidFill>
-            </a:endParaRPr>
           </a:p>
           <a:p>
             <a:pPr marL="285750" indent="-285750">
@@ -17646,31 +17599,7 @@
                   <a:schemeClr val="tx1"/>
                 </a:solidFill>
               </a:rPr>
-              <a:t>Consider bill summary and bill </a:t>
-            </a:r>
-            <a:r>
-              <a:rPr lang="en-US" dirty="0" smtClean="0">
-                <a:solidFill>
-                  <a:schemeClr val="tx1"/>
-                </a:solidFill>
-              </a:rPr>
-              <a:t>categories</a:t>
-            </a:r>
-            <a:r>
-              <a:rPr lang="en-US" dirty="0" smtClean="0">
-                <a:solidFill>
-                  <a:schemeClr val="tx1"/>
-                </a:solidFill>
-              </a:rPr>
-              <a:t> </a:t>
-            </a:r>
-            <a:r>
-              <a:rPr lang="en-US" dirty="0" smtClean="0">
-                <a:solidFill>
-                  <a:schemeClr val="tx1"/>
-                </a:solidFill>
-              </a:rPr>
-              <a:t>as further features. </a:t>
+              <a:t>Consider bill summary and bill categories as further features. </a:t>
             </a:r>
           </a:p>
           <a:p>
@@ -17684,15 +17613,7 @@
                   <a:schemeClr val="tx1"/>
                 </a:solidFill>
               </a:rPr>
-              <a:t>Consider bill summary and bill categories as isolated feature sets</a:t>
-            </a:r>
-            <a:r>
-              <a:rPr lang="en-US" dirty="0" smtClean="0">
-                <a:solidFill>
-                  <a:schemeClr val="tx1"/>
-                </a:solidFill>
-              </a:rPr>
-              <a:t>.</a:t>
+              <a:t>Consider bill summary and bill categories as isolated feature sets.</a:t>
             </a:r>
           </a:p>
           <a:p>
@@ -17904,23 +17825,7 @@
                   <a:schemeClr val="tx1"/>
                 </a:solidFill>
               </a:rPr>
-              <a:t>Can we predict with high accuracy (above a baseline prediction) how a representative will vote on a given </a:t>
-            </a:r>
-            <a:r>
-              <a:rPr lang="en-US" dirty="0" smtClean="0">
-                <a:solidFill>
-                  <a:schemeClr val="tx1"/>
-                </a:solidFill>
-              </a:rPr>
-              <a:t>bill </a:t>
-            </a:r>
-            <a:r>
-              <a:rPr lang="en-US" dirty="0" smtClean="0">
-                <a:solidFill>
-                  <a:schemeClr val="tx1"/>
-                </a:solidFill>
-              </a:rPr>
-              <a:t>in Congress?</a:t>
+              <a:t>Can we predict with high accuracy (above a baseline prediction) how a representative will vote on a given bill in Congress?</a:t>
             </a:r>
           </a:p>
           <a:p>
@@ -18167,8 +18072,21 @@
                   <a:schemeClr val="tx1"/>
                 </a:solidFill>
               </a:rPr>
-              <a:t>Bill Passage Prediction</a:t>
-            </a:r>
+              <a:t>Bill Passage </a:t>
+            </a:r>
+            <a:r>
+              <a:rPr lang="en-US" dirty="0" smtClean="0">
+                <a:solidFill>
+                  <a:schemeClr val="tx1"/>
+                </a:solidFill>
+              </a:rPr>
+              <a:t>Prediction (JOHNS STUFF)</a:t>
+            </a:r>
+            <a:endParaRPr lang="en-US" dirty="0" smtClean="0">
+              <a:solidFill>
+                <a:schemeClr val="tx1"/>
+              </a:solidFill>
+            </a:endParaRPr>
           </a:p>
           <a:p>
             <a:pPr marL="1346926" lvl="1" indent="-285750">
@@ -18213,7 +18131,7 @@
         <p:spPr>
           <a:xfrm>
             <a:off x="24686420" y="4300997"/>
-            <a:ext cx="7542610" cy="1770099"/>
+            <a:ext cx="7542610" cy="2102498"/>
           </a:xfrm>
         </p:spPr>
         <p:txBody>
@@ -18238,15 +18156,7 @@
                   <a:schemeClr val="tx1"/>
                 </a:solidFill>
               </a:rPr>
-              <a:t>epresentatives with lower baseline accuracy tended </a:t>
-            </a:r>
-            <a:r>
-              <a:rPr lang="en-US" dirty="0" smtClean="0">
-                <a:solidFill>
-                  <a:schemeClr val="tx1"/>
-                </a:solidFill>
-              </a:rPr>
-              <a:t>to have much higher accuracies with the optimized SVM.</a:t>
+              <a:t>epresentatives with lower baseline accuracy tended to have much higher accuracies with the optimized SVM.</a:t>
             </a:r>
           </a:p>
           <a:p>
@@ -18260,7 +18170,29 @@
                   <a:schemeClr val="tx1"/>
                 </a:solidFill>
               </a:rPr>
-              <a:t>When party sponsor is not a predominant factor for a representative, our optimized SVM captures other factors and performs well.</a:t>
+              <a:t>When party sponsor is not a predominant factor for a representative, our optimized SVM captures other factors and performs well</a:t>
+            </a:r>
+            <a:r>
+              <a:rPr lang="en-US" dirty="0" smtClean="0">
+                <a:solidFill>
+                  <a:schemeClr val="tx1"/>
+                </a:solidFill>
+              </a:rPr>
+              <a:t>.</a:t>
+            </a:r>
+          </a:p>
+          <a:p>
+            <a:pPr marL="285750" indent="-285750">
+              <a:buFont typeface="Arial" pitchFamily="34" charset="0"/>
+              <a:buChar char="•"/>
+            </a:pPr>
+            <a:r>
+              <a:rPr lang="en-US" dirty="0" smtClean="0">
+                <a:solidFill>
+                  <a:schemeClr val="tx1"/>
+                </a:solidFill>
+              </a:rPr>
+              <a:t>Conclusions from JOHN</a:t>
             </a:r>
             <a:endParaRPr lang="en-US" dirty="0">
               <a:solidFill>
@@ -18282,7 +18214,7 @@
         </p:nvSpPr>
         <p:spPr>
           <a:xfrm>
-            <a:off x="16687800" y="11944004"/>
+            <a:off x="16687800" y="12550362"/>
             <a:ext cx="7542610" cy="606704"/>
           </a:xfrm>
         </p:spPr>
@@ -18442,11 +18374,7 @@
           <a:p>
             <a:r>
               <a:rPr lang="en-US" dirty="0" smtClean="0"/>
-              <a:t>PUT A GRAPHIC IN THIS </a:t>
-            </a:r>
-            <a:r>
-              <a:rPr lang="en-US" dirty="0" smtClean="0"/>
-              <a:t>COLUMN, Histogram of number of bills for each rep</a:t>
+              <a:t>PUT A GRAPHIC IN THIS COLUMN, Histogram of number of bills for each rep</a:t>
             </a:r>
             <a:endParaRPr lang="en-US" dirty="0"/>
           </a:p>
@@ -18507,30 +18435,56 @@
           </a:p>
         </p:txBody>
       </p:sp>
-      <p:sp>
-        <p:nvSpPr>
-          <p:cNvPr id="30" name="Picture Placeholder 29"/>
-          <p:cNvSpPr>
-            <a:spLocks noGrp="1"/>
-          </p:cNvSpPr>
+      <p:pic>
+        <p:nvPicPr>
+          <p:cNvPr id="19" name="Picture Placeholder 18"/>
+          <p:cNvPicPr>
+            <a:picLocks noGrp="1" noChangeAspect="1"/>
+          </p:cNvPicPr>
           <p:nvPr>
             <p:ph type="pic" sz="quarter" idx="115"/>
           </p:nvPr>
-        </p:nvSpPr>
+        </p:nvPicPr>
+        <p:blipFill>
+          <a:blip r:embed="rId3">
+            <a:extLst>
+              <a:ext uri="{28A0092B-C50C-407E-A947-70E740481C1C}">
+                <a14:useLocalDpi xmlns:a14="http://schemas.microsoft.com/office/drawing/2010/main" val="0"/>
+              </a:ext>
+            </a:extLst>
+          </a:blip>
+          <a:srcRect t="7219" b="7219"/>
+          <a:stretch>
+            <a:fillRect/>
+          </a:stretch>
+        </p:blipFill>
         <p:spPr/>
-      </p:sp>
-      <p:sp>
-        <p:nvSpPr>
-          <p:cNvPr id="31" name="Picture Placeholder 30"/>
-          <p:cNvSpPr>
-            <a:spLocks noGrp="1"/>
-          </p:cNvSpPr>
+      </p:pic>
+      <p:pic>
+        <p:nvPicPr>
+          <p:cNvPr id="58" name="Picture Placeholder 57"/>
+          <p:cNvPicPr>
+            <a:picLocks noGrp="1" noChangeAspect="1"/>
+          </p:cNvPicPr>
           <p:nvPr>
             <p:ph type="pic" sz="quarter" idx="126"/>
           </p:nvPr>
-        </p:nvSpPr>
+        </p:nvPicPr>
+        <p:blipFill>
+          <a:blip r:embed="rId3">
+            <a:extLst>
+              <a:ext uri="{28A0092B-C50C-407E-A947-70E740481C1C}">
+                <a14:useLocalDpi xmlns:a14="http://schemas.microsoft.com/office/drawing/2010/main" val="0"/>
+              </a:ext>
+            </a:extLst>
+          </a:blip>
+          <a:srcRect t="7219" b="7219"/>
+          <a:stretch>
+            <a:fillRect/>
+          </a:stretch>
+        </p:blipFill>
         <p:spPr/>
-      </p:sp>
+      </p:pic>
       <p:sp>
         <p:nvSpPr>
           <p:cNvPr id="32" name="Picture Placeholder 31"/>
@@ -18627,18 +18581,34 @@
         </p:nvSpPr>
         <p:spPr/>
       </p:sp>
-      <p:sp>
-        <p:nvSpPr>
-          <p:cNvPr id="40" name="Picture Placeholder 39"/>
-          <p:cNvSpPr>
-            <a:spLocks noGrp="1"/>
-          </p:cNvSpPr>
+      <p:pic>
+        <p:nvPicPr>
+          <p:cNvPr id="62" name="Picture Placeholder 61"/>
+          <p:cNvPicPr>
+            <a:picLocks noGrp="1" noChangeAspect="1"/>
+          </p:cNvPicPr>
           <p:nvPr>
             <p:ph type="pic" sz="quarter" idx="135"/>
           </p:nvPr>
-        </p:nvSpPr>
-        <p:spPr/>
-      </p:sp>
+        </p:nvPicPr>
+        <p:blipFill rotWithShape="1">
+          <a:blip r:embed="rId3">
+            <a:extLst>
+              <a:ext uri="{28A0092B-C50C-407E-A947-70E740481C1C}">
+                <a14:useLocalDpi xmlns:a14="http://schemas.microsoft.com/office/drawing/2010/main" val="0"/>
+              </a:ext>
+            </a:extLst>
+          </a:blip>
+          <a:srcRect l="266" r="-215"/>
+          <a:stretch/>
+        </p:blipFill>
+        <p:spPr>
+          <a:xfrm>
+            <a:off x="17390327" y="6753665"/>
+            <a:ext cx="6072098" cy="4409635"/>
+          </a:xfrm>
+        </p:spPr>
+      </p:pic>
       <p:sp>
         <p:nvSpPr>
           <p:cNvPr id="41" name="Text Placeholder 40"/>
@@ -19028,7 +18998,7 @@
           </p:nvPr>
         </p:nvPicPr>
         <p:blipFill>
-          <a:blip r:embed="rId3" cstate="print">
+          <a:blip r:embed="rId4" cstate="print">
             <a:extLst>
               <a:ext uri="{28A0092B-C50C-407E-A947-70E740481C1C}">
                 <a14:useLocalDpi xmlns:a14="http://schemas.microsoft.com/office/drawing/2010/main" val="0"/>
@@ -19057,7 +19027,7 @@
           </p:nvPr>
         </p:nvPicPr>
         <p:blipFill>
-          <a:blip r:embed="rId4" cstate="print">
+          <a:blip r:embed="rId5" cstate="print">
             <a:extLst>
               <a:ext uri="{28A0092B-C50C-407E-A947-70E740481C1C}">
                 <a14:useLocalDpi xmlns:a14="http://schemas.microsoft.com/office/drawing/2010/main" val="0"/>
@@ -19149,70 +19119,6 @@
           </a:p>
         </p:txBody>
       </p:sp>
-      <p:pic>
-        <p:nvPicPr>
-          <p:cNvPr id="1026" name="Picture 2"/>
-          <p:cNvPicPr>
-            <a:picLocks noChangeAspect="1" noChangeArrowheads="1"/>
-          </p:cNvPicPr>
-          <p:nvPr/>
-        </p:nvPicPr>
-        <p:blipFill>
-          <a:blip r:embed="rId5">
-            <a:extLst>
-              <a:ext uri="{28A0092B-C50C-407E-A947-70E740481C1C}">
-                <a14:useLocalDpi xmlns:a14="http://schemas.microsoft.com/office/drawing/2010/main" val="0"/>
-              </a:ext>
-            </a:extLst>
-          </a:blip>
-          <a:srcRect/>
-          <a:stretch>
-            <a:fillRect/>
-          </a:stretch>
-        </p:blipFill>
-        <p:spPr bwMode="auto">
-          <a:xfrm>
-            <a:off x="16749566" y="7069397"/>
-            <a:ext cx="7453016" cy="5408612"/>
-          </a:xfrm>
-          <a:prstGeom prst="rect">
-            <a:avLst/>
-          </a:prstGeom>
-          <a:noFill/>
-          <a:ln>
-            <a:noFill/>
-          </a:ln>
-          <a:effectLst/>
-          <a:extLst>
-            <a:ext uri="{909E8E84-426E-40DD-AFC4-6F175D3DCCD1}">
-              <a14:hiddenFill xmlns:a14="http://schemas.microsoft.com/office/drawing/2010/main">
-                <a:solidFill>
-                  <a:schemeClr val="accent1"/>
-                </a:solidFill>
-              </a14:hiddenFill>
-            </a:ext>
-            <a:ext uri="{91240B29-F687-4F45-9708-019B960494DF}">
-              <a14:hiddenLine xmlns:a14="http://schemas.microsoft.com/office/drawing/2010/main" w="9525">
-                <a:solidFill>
-                  <a:schemeClr val="tx1"/>
-                </a:solidFill>
-                <a:miter lim="800000"/>
-                <a:headEnd/>
-                <a:tailEnd/>
-              </a14:hiddenLine>
-            </a:ext>
-            <a:ext uri="{AF507438-7753-43E0-B8FC-AC1667EBCBE1}">
-              <a14:hiddenEffects xmlns:a14="http://schemas.microsoft.com/office/drawing/2010/main">
-                <a:effectLst>
-                  <a:outerShdw dist="35921" dir="2700000" algn="ctr" rotWithShape="0">
-                    <a:schemeClr val="bg2"/>
-                  </a:outerShdw>
-                </a:effectLst>
-              </a14:hiddenEffects>
-            </a:ext>
-          </a:extLst>
-        </p:spPr>
-      </p:pic>
     </p:spTree>
     <p:extLst>
       <p:ext uri="{BB962C8B-B14F-4D97-AF65-F5344CB8AC3E}">

</xml_diff>